<commit_message>
added the workshop presentation slides
</commit_message>
<xml_diff>
--- a/Presentation/Bow-Valley-College-TDD-Workshop.pptx
+++ b/Presentation/Bow-Valley-College-TDD-Workshop.pptx
@@ -13300,6 +13300,46 @@
           </a:prstGeom>
         </p:spPr>
       </p:pic>
+      <p:sp>
+        <p:nvSpPr>
+          <p:cNvPr id="5" name="TextBox 4">
+            <a:extLst>
+              <a:ext uri="{FF2B5EF4-FFF2-40B4-BE49-F238E27FC236}">
+                <a16:creationId xmlns:a16="http://schemas.microsoft.com/office/drawing/2014/main" id="{3571C05B-ED4A-8400-B2F5-804D534B1119}"/>
+              </a:ext>
+            </a:extLst>
+          </p:cNvPr>
+          <p:cNvSpPr txBox="1"/>
+          <p:nvPr/>
+        </p:nvSpPr>
+        <p:spPr>
+          <a:xfrm>
+            <a:off x="1154955" y="5943780"/>
+            <a:ext cx="2453366" cy="230832"/>
+          </a:xfrm>
+          <a:prstGeom prst="rect">
+            <a:avLst/>
+          </a:prstGeom>
+          <a:noFill/>
+        </p:spPr>
+        <p:txBody>
+          <a:bodyPr wrap="square" rtlCol="0">
+            <a:spAutoFit/>
+          </a:bodyPr>
+          <a:lstStyle/>
+          <a:p>
+            <a:pPr algn="r"/>
+            <a:r>
+              <a:rPr lang="en-US" sz="900" dirty="0">
+                <a:solidFill>
+                  <a:schemeClr val="bg1"/>
+                </a:solidFill>
+              </a:rPr>
+              <a:t>© 2024 Bow Valley College / Greg Cook</a:t>
+            </a:r>
+          </a:p>
+        </p:txBody>
+      </p:sp>
     </p:spTree>
     <p:extLst>
       <p:ext uri="{BB962C8B-B14F-4D97-AF65-F5344CB8AC3E}">
@@ -14580,6 +14620,46 @@
           </a:p>
         </p:txBody>
       </p:sp>
+      <p:sp>
+        <p:nvSpPr>
+          <p:cNvPr id="4" name="TextBox 3">
+            <a:extLst>
+              <a:ext uri="{FF2B5EF4-FFF2-40B4-BE49-F238E27FC236}">
+                <a16:creationId xmlns:a16="http://schemas.microsoft.com/office/drawing/2014/main" id="{66A6C032-7023-FC93-BD72-383ACCDBDC7B}"/>
+              </a:ext>
+            </a:extLst>
+          </p:cNvPr>
+          <p:cNvSpPr txBox="1"/>
+          <p:nvPr/>
+        </p:nvSpPr>
+        <p:spPr>
+          <a:xfrm>
+            <a:off x="9661161" y="6376682"/>
+            <a:ext cx="2453366" cy="230832"/>
+          </a:xfrm>
+          <a:prstGeom prst="rect">
+            <a:avLst/>
+          </a:prstGeom>
+          <a:noFill/>
+        </p:spPr>
+        <p:txBody>
+          <a:bodyPr wrap="square" rtlCol="0">
+            <a:spAutoFit/>
+          </a:bodyPr>
+          <a:lstStyle/>
+          <a:p>
+            <a:pPr algn="r"/>
+            <a:r>
+              <a:rPr lang="en-US" sz="900" dirty="0">
+                <a:solidFill>
+                  <a:schemeClr val="bg1"/>
+                </a:solidFill>
+              </a:rPr>
+              <a:t>© 2024 Bow Valley College / Greg Cook</a:t>
+            </a:r>
+          </a:p>
+        </p:txBody>
+      </p:sp>
     </p:spTree>
     <p:extLst>
       <p:ext uri="{BB962C8B-B14F-4D97-AF65-F5344CB8AC3E}">
@@ -14695,6 +14775,42 @@
               <a:t>bvc.game.quest</a:t>
             </a:r>
             <a:endParaRPr lang="en-US" sz="3200" dirty="0"/>
+          </a:p>
+        </p:txBody>
+      </p:sp>
+      <p:sp>
+        <p:nvSpPr>
+          <p:cNvPr id="3" name="TextBox 2">
+            <a:extLst>
+              <a:ext uri="{FF2B5EF4-FFF2-40B4-BE49-F238E27FC236}">
+                <a16:creationId xmlns:a16="http://schemas.microsoft.com/office/drawing/2014/main" id="{E535DDEE-EACD-DA6A-3B47-0B50F171D002}"/>
+              </a:ext>
+            </a:extLst>
+          </p:cNvPr>
+          <p:cNvSpPr txBox="1"/>
+          <p:nvPr/>
+        </p:nvSpPr>
+        <p:spPr>
+          <a:xfrm>
+            <a:off x="9661161" y="6376682"/>
+            <a:ext cx="2453366" cy="230832"/>
+          </a:xfrm>
+          <a:prstGeom prst="rect">
+            <a:avLst/>
+          </a:prstGeom>
+          <a:noFill/>
+        </p:spPr>
+        <p:txBody>
+          <a:bodyPr wrap="square" rtlCol="0">
+            <a:spAutoFit/>
+          </a:bodyPr>
+          <a:lstStyle/>
+          <a:p>
+            <a:pPr algn="r"/>
+            <a:r>
+              <a:rPr lang="en-US" sz="900" dirty="0"/>
+              <a:t>© 2024 Bow Valley College / Greg Cook</a:t>
+            </a:r>
           </a:p>
         </p:txBody>
       </p:sp>
@@ -14972,6 +15088,42 @@
           </a:extLst>
         </p:spPr>
       </p:pic>
+      <p:sp>
+        <p:nvSpPr>
+          <p:cNvPr id="4" name="TextBox 3">
+            <a:extLst>
+              <a:ext uri="{FF2B5EF4-FFF2-40B4-BE49-F238E27FC236}">
+                <a16:creationId xmlns:a16="http://schemas.microsoft.com/office/drawing/2014/main" id="{15D427DD-AB12-90DD-B9FD-AE53AF0C2DC2}"/>
+              </a:ext>
+            </a:extLst>
+          </p:cNvPr>
+          <p:cNvSpPr txBox="1"/>
+          <p:nvPr/>
+        </p:nvSpPr>
+        <p:spPr>
+          <a:xfrm>
+            <a:off x="9661161" y="6376682"/>
+            <a:ext cx="2453366" cy="230832"/>
+          </a:xfrm>
+          <a:prstGeom prst="rect">
+            <a:avLst/>
+          </a:prstGeom>
+          <a:noFill/>
+        </p:spPr>
+        <p:txBody>
+          <a:bodyPr wrap="square" rtlCol="0">
+            <a:spAutoFit/>
+          </a:bodyPr>
+          <a:lstStyle/>
+          <a:p>
+            <a:pPr algn="r"/>
+            <a:r>
+              <a:rPr lang="en-US" sz="900" dirty="0"/>
+              <a:t>© 2024 Bow Valley College / Greg Cook</a:t>
+            </a:r>
+          </a:p>
+        </p:txBody>
+      </p:sp>
     </p:spTree>
     <p:extLst>
       <p:ext uri="{BB962C8B-B14F-4D97-AF65-F5344CB8AC3E}">
@@ -15076,6 +15228,42 @@
           </a:extLst>
         </p:spPr>
       </p:pic>
+      <p:sp>
+        <p:nvSpPr>
+          <p:cNvPr id="3" name="TextBox 2">
+            <a:extLst>
+              <a:ext uri="{FF2B5EF4-FFF2-40B4-BE49-F238E27FC236}">
+                <a16:creationId xmlns:a16="http://schemas.microsoft.com/office/drawing/2014/main" id="{CDB9527E-976D-9B0C-615C-70C172461F9C}"/>
+              </a:ext>
+            </a:extLst>
+          </p:cNvPr>
+          <p:cNvSpPr txBox="1"/>
+          <p:nvPr/>
+        </p:nvSpPr>
+        <p:spPr>
+          <a:xfrm>
+            <a:off x="9661161" y="6376682"/>
+            <a:ext cx="2453366" cy="230832"/>
+          </a:xfrm>
+          <a:prstGeom prst="rect">
+            <a:avLst/>
+          </a:prstGeom>
+          <a:noFill/>
+        </p:spPr>
+        <p:txBody>
+          <a:bodyPr wrap="square" rtlCol="0">
+            <a:spAutoFit/>
+          </a:bodyPr>
+          <a:lstStyle/>
+          <a:p>
+            <a:pPr algn="r"/>
+            <a:r>
+              <a:rPr lang="en-US" sz="900" dirty="0"/>
+              <a:t>© 2024 Bow Valley College / Greg Cook</a:t>
+            </a:r>
+          </a:p>
+        </p:txBody>
+      </p:sp>
     </p:spTree>
     <p:extLst>
       <p:ext uri="{BB962C8B-B14F-4D97-AF65-F5344CB8AC3E}">
@@ -15542,6 +15730,42 @@
           </a:p>
         </p:txBody>
       </p:sp>
+      <p:sp>
+        <p:nvSpPr>
+          <p:cNvPr id="5" name="TextBox 4">
+            <a:extLst>
+              <a:ext uri="{FF2B5EF4-FFF2-40B4-BE49-F238E27FC236}">
+                <a16:creationId xmlns:a16="http://schemas.microsoft.com/office/drawing/2014/main" id="{AABAC6D5-56E8-0D2D-8A66-0CBBED94E4C8}"/>
+              </a:ext>
+            </a:extLst>
+          </p:cNvPr>
+          <p:cNvSpPr txBox="1"/>
+          <p:nvPr/>
+        </p:nvSpPr>
+        <p:spPr>
+          <a:xfrm>
+            <a:off x="9661161" y="6376682"/>
+            <a:ext cx="2453366" cy="230832"/>
+          </a:xfrm>
+          <a:prstGeom prst="rect">
+            <a:avLst/>
+          </a:prstGeom>
+          <a:noFill/>
+        </p:spPr>
+        <p:txBody>
+          <a:bodyPr wrap="square" rtlCol="0">
+            <a:spAutoFit/>
+          </a:bodyPr>
+          <a:lstStyle/>
+          <a:p>
+            <a:pPr algn="r"/>
+            <a:r>
+              <a:rPr lang="en-US" sz="900" dirty="0"/>
+              <a:t>© 2024 Bow Valley College / Greg Cook</a:t>
+            </a:r>
+          </a:p>
+        </p:txBody>
+      </p:sp>
     </p:spTree>
     <p:extLst>
       <p:ext uri="{BB962C8B-B14F-4D97-AF65-F5344CB8AC3E}">
@@ -16024,6 +16248,42 @@
           </a:p>
         </p:txBody>
       </p:sp>
+      <p:sp>
+        <p:nvSpPr>
+          <p:cNvPr id="5" name="TextBox 4">
+            <a:extLst>
+              <a:ext uri="{FF2B5EF4-FFF2-40B4-BE49-F238E27FC236}">
+                <a16:creationId xmlns:a16="http://schemas.microsoft.com/office/drawing/2014/main" id="{81198646-7B6E-DECB-7434-2F75B250D8F1}"/>
+              </a:ext>
+            </a:extLst>
+          </p:cNvPr>
+          <p:cNvSpPr txBox="1"/>
+          <p:nvPr/>
+        </p:nvSpPr>
+        <p:spPr>
+          <a:xfrm>
+            <a:off x="9661161" y="6376682"/>
+            <a:ext cx="2453366" cy="230832"/>
+          </a:xfrm>
+          <a:prstGeom prst="rect">
+            <a:avLst/>
+          </a:prstGeom>
+          <a:noFill/>
+        </p:spPr>
+        <p:txBody>
+          <a:bodyPr wrap="square" rtlCol="0">
+            <a:spAutoFit/>
+          </a:bodyPr>
+          <a:lstStyle/>
+          <a:p>
+            <a:pPr algn="r"/>
+            <a:r>
+              <a:rPr lang="en-US" sz="900" dirty="0"/>
+              <a:t>© 2024 Bow Valley College / Greg Cook</a:t>
+            </a:r>
+          </a:p>
+        </p:txBody>
+      </p:sp>
     </p:spTree>
     <p:extLst>
       <p:ext uri="{BB962C8B-B14F-4D97-AF65-F5344CB8AC3E}">
@@ -16724,6 +16984,42 @@
                 <a:srgbClr val="FFFFFF"/>
               </a:highlight>
             </a:endParaRPr>
+          </a:p>
+        </p:txBody>
+      </p:sp>
+      <p:sp>
+        <p:nvSpPr>
+          <p:cNvPr id="3" name="TextBox 2">
+            <a:extLst>
+              <a:ext uri="{FF2B5EF4-FFF2-40B4-BE49-F238E27FC236}">
+                <a16:creationId xmlns:a16="http://schemas.microsoft.com/office/drawing/2014/main" id="{D558F96E-3909-9714-2953-8330DD9330A7}"/>
+              </a:ext>
+            </a:extLst>
+          </p:cNvPr>
+          <p:cNvSpPr txBox="1"/>
+          <p:nvPr/>
+        </p:nvSpPr>
+        <p:spPr>
+          <a:xfrm>
+            <a:off x="9661161" y="6376682"/>
+            <a:ext cx="2453366" cy="230832"/>
+          </a:xfrm>
+          <a:prstGeom prst="rect">
+            <a:avLst/>
+          </a:prstGeom>
+          <a:noFill/>
+        </p:spPr>
+        <p:txBody>
+          <a:bodyPr wrap="square" rtlCol="0">
+            <a:spAutoFit/>
+          </a:bodyPr>
+          <a:lstStyle/>
+          <a:p>
+            <a:pPr algn="r"/>
+            <a:r>
+              <a:rPr lang="en-US" sz="900" dirty="0"/>
+              <a:t>© 2024 Bow Valley College / Greg Cook</a:t>
+            </a:r>
           </a:p>
         </p:txBody>
       </p:sp>
@@ -17156,7 +17452,7 @@
                 </a:highlight>
                 <a:extLst>
                   <a:ext uri="http://customooxmlschemas.google.com/">
-                    <go:slidesCustomData xmlns="" xmlns:mc="http://schemas.openxmlformats.org/markup-compatibility/2006" xmlns:mv="urn:schemas-microsoft-com:mac:vml" xmlns:c="http://schemas.openxmlformats.org/drawingml/2006/chart" xmlns:dgm="http://schemas.openxmlformats.org/drawingml/2006/diagram" xmlns:o="urn:schemas-microsoft-com:office:office" xmlns:v="urn:schemas-microsoft-com:vml" xmlns:pvml="urn:schemas-microsoft-com:office:powerpoint" xmlns:com="http://schemas.openxmlformats.org/drawingml/2006/compatibility" xmlns:p14="http://schemas.microsoft.com/office/powerpoint/2010/main" xmlns:p15="http://schemas.microsoft.com/office/powerpoint/2012/main" xmlns:ahyp="http://schemas.microsoft.com/office/drawing/2018/hyperlinkcolor" xmlns:go="http://customooxmlschemas.google.com/" textRoundtripDataId="8"/>
+                    <go:slidesCustomData xmlns:go="http://customooxmlschemas.google.com/" xmlns:ahyp="http://schemas.microsoft.com/office/drawing/2018/hyperlinkcolor" xmlns:p15="http://schemas.microsoft.com/office/powerpoint/2012/main" xmlns:p14="http://schemas.microsoft.com/office/powerpoint/2010/main" xmlns:com="http://schemas.openxmlformats.org/drawingml/2006/compatibility" xmlns:pvml="urn:schemas-microsoft-com:office:powerpoint" xmlns:v="urn:schemas-microsoft-com:vml" xmlns:o="urn:schemas-microsoft-com:office:office" xmlns:dgm="http://schemas.openxmlformats.org/drawingml/2006/diagram" xmlns:c="http://schemas.openxmlformats.org/drawingml/2006/chart" xmlns:mv="urn:schemas-microsoft-com:mac:vml" xmlns:mc="http://schemas.openxmlformats.org/markup-compatibility/2006" xmlns="" textRoundtripDataId="8"/>
                   </a:ext>
                 </a:extLst>
               </a:rPr>
@@ -17316,6 +17612,42 @@
                 <a:srgbClr val="FFFFFF"/>
               </a:highlight>
             </a:endParaRPr>
+          </a:p>
+        </p:txBody>
+      </p:sp>
+      <p:sp>
+        <p:nvSpPr>
+          <p:cNvPr id="3" name="TextBox 2">
+            <a:extLst>
+              <a:ext uri="{FF2B5EF4-FFF2-40B4-BE49-F238E27FC236}">
+                <a16:creationId xmlns:a16="http://schemas.microsoft.com/office/drawing/2014/main" id="{735D2A8F-5D99-5EBF-35B0-13B0BAE2D047}"/>
+              </a:ext>
+            </a:extLst>
+          </p:cNvPr>
+          <p:cNvSpPr txBox="1"/>
+          <p:nvPr/>
+        </p:nvSpPr>
+        <p:spPr>
+          <a:xfrm>
+            <a:off x="9661161" y="6376682"/>
+            <a:ext cx="2453366" cy="230832"/>
+          </a:xfrm>
+          <a:prstGeom prst="rect">
+            <a:avLst/>
+          </a:prstGeom>
+          <a:noFill/>
+        </p:spPr>
+        <p:txBody>
+          <a:bodyPr wrap="square" rtlCol="0">
+            <a:spAutoFit/>
+          </a:bodyPr>
+          <a:lstStyle/>
+          <a:p>
+            <a:pPr algn="r"/>
+            <a:r>
+              <a:rPr lang="en-US" sz="900" dirty="0"/>
+              <a:t>© 2024 Bow Valley College / Greg Cook</a:t>
+            </a:r>
           </a:p>
         </p:txBody>
       </p:sp>
@@ -18622,6 +18954,46 @@
           </a:p>
         </p:txBody>
       </p:sp>
+      <p:sp>
+        <p:nvSpPr>
+          <p:cNvPr id="4" name="TextBox 3">
+            <a:extLst>
+              <a:ext uri="{FF2B5EF4-FFF2-40B4-BE49-F238E27FC236}">
+                <a16:creationId xmlns:a16="http://schemas.microsoft.com/office/drawing/2014/main" id="{BECBA4E1-B332-B78C-0295-C31A50F838E7}"/>
+              </a:ext>
+            </a:extLst>
+          </p:cNvPr>
+          <p:cNvSpPr txBox="1"/>
+          <p:nvPr/>
+        </p:nvSpPr>
+        <p:spPr>
+          <a:xfrm>
+            <a:off x="9661161" y="6376682"/>
+            <a:ext cx="2453366" cy="230832"/>
+          </a:xfrm>
+          <a:prstGeom prst="rect">
+            <a:avLst/>
+          </a:prstGeom>
+          <a:noFill/>
+        </p:spPr>
+        <p:txBody>
+          <a:bodyPr wrap="square" rtlCol="0">
+            <a:spAutoFit/>
+          </a:bodyPr>
+          <a:lstStyle/>
+          <a:p>
+            <a:pPr algn="r"/>
+            <a:r>
+              <a:rPr lang="en-US" sz="900" dirty="0">
+                <a:solidFill>
+                  <a:schemeClr val="bg1"/>
+                </a:solidFill>
+              </a:rPr>
+              <a:t>© 2024 Bow Valley College / Greg Cook</a:t>
+            </a:r>
+          </a:p>
+        </p:txBody>
+      </p:sp>
     </p:spTree>
     <p:extLst>
       <p:ext uri="{BB962C8B-B14F-4D97-AF65-F5344CB8AC3E}">
@@ -19855,6 +20227,46 @@
                 <a:srgbClr val="FFFFFF"/>
               </a:solidFill>
             </a:endParaRPr>
+          </a:p>
+        </p:txBody>
+      </p:sp>
+      <p:sp>
+        <p:nvSpPr>
+          <p:cNvPr id="4" name="TextBox 3">
+            <a:extLst>
+              <a:ext uri="{FF2B5EF4-FFF2-40B4-BE49-F238E27FC236}">
+                <a16:creationId xmlns:a16="http://schemas.microsoft.com/office/drawing/2014/main" id="{A21D14F1-7B91-899B-D7CD-23474F544941}"/>
+              </a:ext>
+            </a:extLst>
+          </p:cNvPr>
+          <p:cNvSpPr txBox="1"/>
+          <p:nvPr/>
+        </p:nvSpPr>
+        <p:spPr>
+          <a:xfrm>
+            <a:off x="9661161" y="6376682"/>
+            <a:ext cx="2453366" cy="230832"/>
+          </a:xfrm>
+          <a:prstGeom prst="rect">
+            <a:avLst/>
+          </a:prstGeom>
+          <a:noFill/>
+        </p:spPr>
+        <p:txBody>
+          <a:bodyPr wrap="square" rtlCol="0">
+            <a:spAutoFit/>
+          </a:bodyPr>
+          <a:lstStyle/>
+          <a:p>
+            <a:pPr algn="r"/>
+            <a:r>
+              <a:rPr lang="en-US" sz="900" dirty="0">
+                <a:solidFill>
+                  <a:schemeClr val="bg1"/>
+                </a:solidFill>
+              </a:rPr>
+              <a:t>© 2024 Bow Valley College / Greg Cook</a:t>
+            </a:r>
           </a:p>
         </p:txBody>
       </p:sp>
@@ -20291,15 +20703,7 @@
                   <a:srgbClr val="3F3F3F"/>
                 </a:solidFill>
               </a:rPr>
-              <a:t>My </a:t>
-            </a:r>
-            <a:r>
-              <a:rPr lang="en-US" sz="1050">
-                <a:solidFill>
-                  <a:srgbClr val="3F3F3F"/>
-                </a:solidFill>
-              </a:rPr>
-              <a:t>Journey?</a:t>
+              <a:t>My Journey?</a:t>
             </a:r>
             <a:endParaRPr lang="en-US" sz="900" dirty="0">
               <a:solidFill>
@@ -20482,6 +20886,42 @@
           </a:prstGeom>
         </p:spPr>
       </p:pic>
+      <p:sp>
+        <p:nvSpPr>
+          <p:cNvPr id="5" name="TextBox 4">
+            <a:extLst>
+              <a:ext uri="{FF2B5EF4-FFF2-40B4-BE49-F238E27FC236}">
+                <a16:creationId xmlns:a16="http://schemas.microsoft.com/office/drawing/2014/main" id="{E1ED00B6-61E6-1F85-270C-0878B10BEDF1}"/>
+              </a:ext>
+            </a:extLst>
+          </p:cNvPr>
+          <p:cNvSpPr txBox="1"/>
+          <p:nvPr/>
+        </p:nvSpPr>
+        <p:spPr>
+          <a:xfrm>
+            <a:off x="9661161" y="6376682"/>
+            <a:ext cx="2453366" cy="230832"/>
+          </a:xfrm>
+          <a:prstGeom prst="rect">
+            <a:avLst/>
+          </a:prstGeom>
+          <a:noFill/>
+        </p:spPr>
+        <p:txBody>
+          <a:bodyPr wrap="square" rtlCol="0">
+            <a:spAutoFit/>
+          </a:bodyPr>
+          <a:lstStyle/>
+          <a:p>
+            <a:pPr algn="r"/>
+            <a:r>
+              <a:rPr lang="en-US" sz="900" dirty="0"/>
+              <a:t>© 2024 Bow Valley College / Greg Cook</a:t>
+            </a:r>
+          </a:p>
+        </p:txBody>
+      </p:sp>
     </p:spTree>
     <p:extLst>
       <p:ext uri="{BB962C8B-B14F-4D97-AF65-F5344CB8AC3E}">
@@ -21983,6 +22423,46 @@
                 <a:srgbClr val="FFFFFF"/>
               </a:solidFill>
             </a:endParaRPr>
+          </a:p>
+        </p:txBody>
+      </p:sp>
+      <p:sp>
+        <p:nvSpPr>
+          <p:cNvPr id="4" name="TextBox 3">
+            <a:extLst>
+              <a:ext uri="{FF2B5EF4-FFF2-40B4-BE49-F238E27FC236}">
+                <a16:creationId xmlns:a16="http://schemas.microsoft.com/office/drawing/2014/main" id="{851A106A-00E6-A19C-9E00-DC08B0EA3B3C}"/>
+              </a:ext>
+            </a:extLst>
+          </p:cNvPr>
+          <p:cNvSpPr txBox="1"/>
+          <p:nvPr/>
+        </p:nvSpPr>
+        <p:spPr>
+          <a:xfrm>
+            <a:off x="9661161" y="6376682"/>
+            <a:ext cx="2453366" cy="230832"/>
+          </a:xfrm>
+          <a:prstGeom prst="rect">
+            <a:avLst/>
+          </a:prstGeom>
+          <a:noFill/>
+        </p:spPr>
+        <p:txBody>
+          <a:bodyPr wrap="square" rtlCol="0">
+            <a:spAutoFit/>
+          </a:bodyPr>
+          <a:lstStyle/>
+          <a:p>
+            <a:pPr algn="r"/>
+            <a:r>
+              <a:rPr lang="en-US" sz="900" dirty="0">
+                <a:solidFill>
+                  <a:schemeClr val="bg1"/>
+                </a:solidFill>
+              </a:rPr>
+              <a:t>© 2024 Bow Valley College / Greg Cook</a:t>
+            </a:r>
           </a:p>
         </p:txBody>
       </p:sp>
@@ -22602,6 +23082,42 @@
           </a:p>
         </p:txBody>
       </p:sp>
+      <p:sp>
+        <p:nvSpPr>
+          <p:cNvPr id="3" name="TextBox 2">
+            <a:extLst>
+              <a:ext uri="{FF2B5EF4-FFF2-40B4-BE49-F238E27FC236}">
+                <a16:creationId xmlns:a16="http://schemas.microsoft.com/office/drawing/2014/main" id="{5E03D8A2-09F2-C71C-A496-A9D96D1751B5}"/>
+              </a:ext>
+            </a:extLst>
+          </p:cNvPr>
+          <p:cNvSpPr txBox="1"/>
+          <p:nvPr/>
+        </p:nvSpPr>
+        <p:spPr>
+          <a:xfrm>
+            <a:off x="9661161" y="6376682"/>
+            <a:ext cx="2453366" cy="230832"/>
+          </a:xfrm>
+          <a:prstGeom prst="rect">
+            <a:avLst/>
+          </a:prstGeom>
+          <a:noFill/>
+        </p:spPr>
+        <p:txBody>
+          <a:bodyPr wrap="square" rtlCol="0">
+            <a:spAutoFit/>
+          </a:bodyPr>
+          <a:lstStyle/>
+          <a:p>
+            <a:pPr algn="r"/>
+            <a:r>
+              <a:rPr lang="en-US" sz="900" dirty="0"/>
+              <a:t>© 2024 Bow Valley College / Greg Cook</a:t>
+            </a:r>
+          </a:p>
+        </p:txBody>
+      </p:sp>
     </p:spTree>
     <p:extLst>
       <p:ext uri="{BB962C8B-B14F-4D97-AF65-F5344CB8AC3E}">
@@ -23071,6 +23587,42 @@
           </a:p>
         </p:txBody>
       </p:sp>
+      <p:sp>
+        <p:nvSpPr>
+          <p:cNvPr id="6" name="TextBox 5">
+            <a:extLst>
+              <a:ext uri="{FF2B5EF4-FFF2-40B4-BE49-F238E27FC236}">
+                <a16:creationId xmlns:a16="http://schemas.microsoft.com/office/drawing/2014/main" id="{486A06B8-7845-EF01-B924-4091A4DA4D22}"/>
+              </a:ext>
+            </a:extLst>
+          </p:cNvPr>
+          <p:cNvSpPr txBox="1"/>
+          <p:nvPr/>
+        </p:nvSpPr>
+        <p:spPr>
+          <a:xfrm>
+            <a:off x="9661161" y="6376682"/>
+            <a:ext cx="2453366" cy="230832"/>
+          </a:xfrm>
+          <a:prstGeom prst="rect">
+            <a:avLst/>
+          </a:prstGeom>
+          <a:noFill/>
+        </p:spPr>
+        <p:txBody>
+          <a:bodyPr wrap="square" rtlCol="0">
+            <a:spAutoFit/>
+          </a:bodyPr>
+          <a:lstStyle/>
+          <a:p>
+            <a:pPr algn="r"/>
+            <a:r>
+              <a:rPr lang="en-US" sz="900" dirty="0"/>
+              <a:t>© 2024 Bow Valley College / Greg Cook</a:t>
+            </a:r>
+          </a:p>
+        </p:txBody>
+      </p:sp>
     </p:spTree>
     <p:extLst>
       <p:ext uri="{BB962C8B-B14F-4D97-AF65-F5344CB8AC3E}">
@@ -24330,6 +24882,46 @@
           </a:p>
         </p:txBody>
       </p:sp>
+      <p:sp>
+        <p:nvSpPr>
+          <p:cNvPr id="3" name="TextBox 2">
+            <a:extLst>
+              <a:ext uri="{FF2B5EF4-FFF2-40B4-BE49-F238E27FC236}">
+                <a16:creationId xmlns:a16="http://schemas.microsoft.com/office/drawing/2014/main" id="{7931CA8D-3F76-1B4E-CD30-A0E5F0054956}"/>
+              </a:ext>
+            </a:extLst>
+          </p:cNvPr>
+          <p:cNvSpPr txBox="1"/>
+          <p:nvPr/>
+        </p:nvSpPr>
+        <p:spPr>
+          <a:xfrm>
+            <a:off x="9661161" y="6376682"/>
+            <a:ext cx="2453366" cy="230832"/>
+          </a:xfrm>
+          <a:prstGeom prst="rect">
+            <a:avLst/>
+          </a:prstGeom>
+          <a:noFill/>
+        </p:spPr>
+        <p:txBody>
+          <a:bodyPr wrap="square" rtlCol="0">
+            <a:spAutoFit/>
+          </a:bodyPr>
+          <a:lstStyle/>
+          <a:p>
+            <a:pPr algn="r"/>
+            <a:r>
+              <a:rPr lang="en-US" sz="900" dirty="0">
+                <a:solidFill>
+                  <a:schemeClr val="bg1"/>
+                </a:solidFill>
+              </a:rPr>
+              <a:t>© 2024 Bow Valley College / Greg Cook</a:t>
+            </a:r>
+          </a:p>
+        </p:txBody>
+      </p:sp>
     </p:spTree>
     <p:extLst>
       <p:ext uri="{BB962C8B-B14F-4D97-AF65-F5344CB8AC3E}">
@@ -24633,6 +25225,42 @@
           </a:effectLst>
         </p:spPr>
       </p:pic>
+      <p:sp>
+        <p:nvSpPr>
+          <p:cNvPr id="4" name="TextBox 3">
+            <a:extLst>
+              <a:ext uri="{FF2B5EF4-FFF2-40B4-BE49-F238E27FC236}">
+                <a16:creationId xmlns:a16="http://schemas.microsoft.com/office/drawing/2014/main" id="{5FB6E722-CFA9-594C-5EB3-4AF4C369375B}"/>
+              </a:ext>
+            </a:extLst>
+          </p:cNvPr>
+          <p:cNvSpPr txBox="1"/>
+          <p:nvPr/>
+        </p:nvSpPr>
+        <p:spPr>
+          <a:xfrm>
+            <a:off x="9661161" y="6376682"/>
+            <a:ext cx="2453366" cy="230832"/>
+          </a:xfrm>
+          <a:prstGeom prst="rect">
+            <a:avLst/>
+          </a:prstGeom>
+          <a:noFill/>
+        </p:spPr>
+        <p:txBody>
+          <a:bodyPr wrap="square" rtlCol="0">
+            <a:spAutoFit/>
+          </a:bodyPr>
+          <a:lstStyle/>
+          <a:p>
+            <a:pPr algn="r"/>
+            <a:r>
+              <a:rPr lang="en-US" sz="900" dirty="0"/>
+              <a:t>© 2024 Bow Valley College / Greg Cook</a:t>
+            </a:r>
+          </a:p>
+        </p:txBody>
+      </p:sp>
     </p:spTree>
     <p:extLst>
       <p:ext uri="{BB962C8B-B14F-4D97-AF65-F5344CB8AC3E}">
@@ -25464,6 +26092,42 @@
           </a:prstGeom>
         </p:spPr>
       </p:pic>
+      <p:sp>
+        <p:nvSpPr>
+          <p:cNvPr id="3" name="TextBox 2">
+            <a:extLst>
+              <a:ext uri="{FF2B5EF4-FFF2-40B4-BE49-F238E27FC236}">
+                <a16:creationId xmlns:a16="http://schemas.microsoft.com/office/drawing/2014/main" id="{B6BB2A39-69EF-CBB6-0E7B-33879FD3DB54}"/>
+              </a:ext>
+            </a:extLst>
+          </p:cNvPr>
+          <p:cNvSpPr txBox="1"/>
+          <p:nvPr/>
+        </p:nvSpPr>
+        <p:spPr>
+          <a:xfrm>
+            <a:off x="9661161" y="6376682"/>
+            <a:ext cx="2453366" cy="230832"/>
+          </a:xfrm>
+          <a:prstGeom prst="rect">
+            <a:avLst/>
+          </a:prstGeom>
+          <a:noFill/>
+        </p:spPr>
+        <p:txBody>
+          <a:bodyPr wrap="square" rtlCol="0">
+            <a:spAutoFit/>
+          </a:bodyPr>
+          <a:lstStyle/>
+          <a:p>
+            <a:pPr algn="r"/>
+            <a:r>
+              <a:rPr lang="en-US" sz="900" dirty="0"/>
+              <a:t>© 2024 Bow Valley College / Greg Cook</a:t>
+            </a:r>
+          </a:p>
+        </p:txBody>
+      </p:sp>
     </p:spTree>
     <p:extLst>
       <p:ext uri="{BB962C8B-B14F-4D97-AF65-F5344CB8AC3E}">
@@ -25612,6 +26276,42 @@
             <a:r>
               <a:rPr lang="en-US" dirty="0"/>
               <a:t>Defined boundaries within the larger domain where specific models and languages apply.</a:t>
+            </a:r>
+          </a:p>
+        </p:txBody>
+      </p:sp>
+      <p:sp>
+        <p:nvSpPr>
+          <p:cNvPr id="4" name="TextBox 3">
+            <a:extLst>
+              <a:ext uri="{FF2B5EF4-FFF2-40B4-BE49-F238E27FC236}">
+                <a16:creationId xmlns:a16="http://schemas.microsoft.com/office/drawing/2014/main" id="{DEF3BD2D-584F-8476-0EED-4FDCEF454BF3}"/>
+              </a:ext>
+            </a:extLst>
+          </p:cNvPr>
+          <p:cNvSpPr txBox="1"/>
+          <p:nvPr/>
+        </p:nvSpPr>
+        <p:spPr>
+          <a:xfrm>
+            <a:off x="9661161" y="6376682"/>
+            <a:ext cx="2453366" cy="230832"/>
+          </a:xfrm>
+          <a:prstGeom prst="rect">
+            <a:avLst/>
+          </a:prstGeom>
+          <a:noFill/>
+        </p:spPr>
+        <p:txBody>
+          <a:bodyPr wrap="square" rtlCol="0">
+            <a:spAutoFit/>
+          </a:bodyPr>
+          <a:lstStyle/>
+          <a:p>
+            <a:pPr algn="r"/>
+            <a:r>
+              <a:rPr lang="en-US" sz="900" dirty="0"/>
+              <a:t>© 2024 Bow Valley College / Greg Cook</a:t>
             </a:r>
           </a:p>
         </p:txBody>
@@ -26846,6 +27546,46 @@
           </a:p>
         </p:txBody>
       </p:sp>
+      <p:sp>
+        <p:nvSpPr>
+          <p:cNvPr id="4" name="TextBox 3">
+            <a:extLst>
+              <a:ext uri="{FF2B5EF4-FFF2-40B4-BE49-F238E27FC236}">
+                <a16:creationId xmlns:a16="http://schemas.microsoft.com/office/drawing/2014/main" id="{A5467072-D435-0847-25A3-B1A6D67428DC}"/>
+              </a:ext>
+            </a:extLst>
+          </p:cNvPr>
+          <p:cNvSpPr txBox="1"/>
+          <p:nvPr/>
+        </p:nvSpPr>
+        <p:spPr>
+          <a:xfrm>
+            <a:off x="9661161" y="6376682"/>
+            <a:ext cx="2453366" cy="230832"/>
+          </a:xfrm>
+          <a:prstGeom prst="rect">
+            <a:avLst/>
+          </a:prstGeom>
+          <a:noFill/>
+        </p:spPr>
+        <p:txBody>
+          <a:bodyPr wrap="square" rtlCol="0">
+            <a:spAutoFit/>
+          </a:bodyPr>
+          <a:lstStyle/>
+          <a:p>
+            <a:pPr algn="r"/>
+            <a:r>
+              <a:rPr lang="en-US" sz="900" dirty="0">
+                <a:solidFill>
+                  <a:schemeClr val="bg1"/>
+                </a:solidFill>
+              </a:rPr>
+              <a:t>© 2024 Bow Valley College / Greg Cook</a:t>
+            </a:r>
+          </a:p>
+        </p:txBody>
+      </p:sp>
     </p:spTree>
     <p:extLst>
       <p:ext uri="{BB962C8B-B14F-4D97-AF65-F5344CB8AC3E}">
@@ -28242,6 +28982,46 @@
                 <a:srgbClr val="FFFFFF"/>
               </a:solidFill>
             </a:endParaRPr>
+          </a:p>
+        </p:txBody>
+      </p:sp>
+      <p:sp>
+        <p:nvSpPr>
+          <p:cNvPr id="4" name="TextBox 3">
+            <a:extLst>
+              <a:ext uri="{FF2B5EF4-FFF2-40B4-BE49-F238E27FC236}">
+                <a16:creationId xmlns:a16="http://schemas.microsoft.com/office/drawing/2014/main" id="{DBBBCFEE-4E5B-DEFE-4F15-B25EC3AEB819}"/>
+              </a:ext>
+            </a:extLst>
+          </p:cNvPr>
+          <p:cNvSpPr txBox="1"/>
+          <p:nvPr/>
+        </p:nvSpPr>
+        <p:spPr>
+          <a:xfrm>
+            <a:off x="9661161" y="6376682"/>
+            <a:ext cx="2453366" cy="230832"/>
+          </a:xfrm>
+          <a:prstGeom prst="rect">
+            <a:avLst/>
+          </a:prstGeom>
+          <a:noFill/>
+        </p:spPr>
+        <p:txBody>
+          <a:bodyPr wrap="square" rtlCol="0">
+            <a:spAutoFit/>
+          </a:bodyPr>
+          <a:lstStyle/>
+          <a:p>
+            <a:pPr algn="r"/>
+            <a:r>
+              <a:rPr lang="en-US" sz="900" dirty="0">
+                <a:solidFill>
+                  <a:schemeClr val="bg1"/>
+                </a:solidFill>
+              </a:rPr>
+              <a:t>© 2024 Bow Valley College / Greg Cook</a:t>
+            </a:r>
           </a:p>
         </p:txBody>
       </p:sp>

</xml_diff>